<commit_message>
Finalizando e criando as 2 versoes do projeto
</commit_message>
<xml_diff>
--- a/UsandoApi.pptx
+++ b/UsandoApi.pptx
@@ -22,6 +22,7 @@
     <p:sldId id="269" r:id="rId16"/>
     <p:sldId id="270" r:id="rId17"/>
     <p:sldId id="268" r:id="rId18"/>
+    <p:sldId id="273" r:id="rId19"/>
   </p:sldIdLst>
   <p:sldSz cx="12192000" cy="6858000"/>
   <p:notesSz cx="6858000" cy="9144000"/>
@@ -6910,6 +6911,103 @@
 </p:sld>
 </file>
 
+<file path=ppt/slides/slide18.xml><?xml version="1.0" encoding="utf-8"?>
+<p:sld xmlns:a="http://schemas.openxmlformats.org/drawingml/2006/main" xmlns:r="http://schemas.openxmlformats.org/officeDocument/2006/relationships" xmlns:p="http://schemas.openxmlformats.org/presentationml/2006/main">
+  <p:cSld>
+    <p:spTree>
+      <p:nvGrpSpPr>
+        <p:cNvPr id="1" name=""/>
+        <p:cNvGrpSpPr/>
+        <p:nvPr/>
+      </p:nvGrpSpPr>
+      <p:grpSpPr>
+        <a:xfrm>
+          <a:off x="0" y="0"/>
+          <a:ext cx="0" cy="0"/>
+          <a:chOff x="0" y="0"/>
+          <a:chExt cx="0" cy="0"/>
+        </a:xfrm>
+      </p:grpSpPr>
+      <p:sp>
+        <p:nvSpPr>
+          <p:cNvPr id="2" name="Título 1">
+            <a:extLst>
+              <a:ext uri="{FF2B5EF4-FFF2-40B4-BE49-F238E27FC236}">
+                <a16:creationId xmlns:a16="http://schemas.microsoft.com/office/drawing/2014/main" id="{AE99A833-7034-4B67-B886-D557CE7E0FF1}"/>
+              </a:ext>
+            </a:extLst>
+          </p:cNvPr>
+          <p:cNvSpPr>
+            <a:spLocks noGrp="1"/>
+          </p:cNvSpPr>
+          <p:nvPr>
+            <p:ph type="title"/>
+          </p:nvPr>
+        </p:nvSpPr>
+        <p:spPr>
+          <a:xfrm>
+            <a:off x="685801" y="3072384"/>
+            <a:ext cx="10131425" cy="1456267"/>
+          </a:xfrm>
+        </p:spPr>
+        <p:txBody>
+          <a:bodyPr/>
+          <a:lstStyle/>
+          <a:p>
+            <a:r>
+              <a:rPr lang="en-US" dirty="0" err="1"/>
+              <a:t>Vamos</a:t>
+            </a:r>
+            <a:r>
+              <a:rPr lang="en-US" dirty="0"/>
+              <a:t> </a:t>
+            </a:r>
+            <a:r>
+              <a:rPr lang="en-US" dirty="0" err="1"/>
+              <a:t>lá</a:t>
+            </a:r>
+            <a:endParaRPr lang="pt-BR" dirty="0"/>
+          </a:p>
+        </p:txBody>
+      </p:sp>
+      <p:sp>
+        <p:nvSpPr>
+          <p:cNvPr id="3" name="Espaço Reservado para Conteúdo 2">
+            <a:extLst>
+              <a:ext uri="{FF2B5EF4-FFF2-40B4-BE49-F238E27FC236}">
+                <a16:creationId xmlns:a16="http://schemas.microsoft.com/office/drawing/2014/main" id="{78072616-B47C-42A5-8928-EB64F490DDF0}"/>
+              </a:ext>
+            </a:extLst>
+          </p:cNvPr>
+          <p:cNvSpPr>
+            <a:spLocks noGrp="1"/>
+          </p:cNvSpPr>
+          <p:nvPr>
+            <p:ph idx="1"/>
+          </p:nvPr>
+        </p:nvSpPr>
+        <p:spPr/>
+        <p:txBody>
+          <a:bodyPr/>
+          <a:lstStyle/>
+          <a:p>
+            <a:endParaRPr lang="pt-BR" dirty="0"/>
+          </a:p>
+        </p:txBody>
+      </p:sp>
+    </p:spTree>
+    <p:extLst>
+      <p:ext uri="{BB962C8B-B14F-4D97-AF65-F5344CB8AC3E}">
+        <p14:creationId xmlns:p14="http://schemas.microsoft.com/office/powerpoint/2010/main" val="624751311"/>
+      </p:ext>
+    </p:extLst>
+  </p:cSld>
+  <p:clrMapOvr>
+    <a:masterClrMapping/>
+  </p:clrMapOvr>
+</p:sld>
+</file>
+
 <file path=ppt/slides/slide2.xml><?xml version="1.0" encoding="utf-8"?>
 <p:sld xmlns:a="http://schemas.openxmlformats.org/drawingml/2006/main" xmlns:r="http://schemas.openxmlformats.org/officeDocument/2006/relationships" xmlns:p="http://schemas.openxmlformats.org/presentationml/2006/main">
   <p:cSld>
@@ -7097,10 +7195,10 @@
           <a:lstStyle/>
           <a:p>
             <a:r>
-              <a:rPr lang="en-US" dirty="0"/>
+              <a:rPr lang="en-US" b="1" dirty="0"/>
               <a:t>José Vinicius</a:t>
             </a:r>
-            <a:endParaRPr lang="pt-BR" dirty="0"/>
+            <a:endParaRPr lang="pt-BR" b="1" dirty="0"/>
           </a:p>
         </p:txBody>
       </p:sp>
@@ -7469,47 +7567,32 @@
       </p:sp>
       <p:pic>
         <p:nvPicPr>
-          <p:cNvPr id="3074" name="Picture 2">
+          <p:cNvPr id="4" name="Imagem 3">
             <a:extLst>
               <a:ext uri="{FF2B5EF4-FFF2-40B4-BE49-F238E27FC236}">
-                <a16:creationId xmlns:a16="http://schemas.microsoft.com/office/drawing/2014/main" id="{E8039EE3-1EE2-4128-8305-A729CF955FAF}"/>
+                <a16:creationId xmlns:a16="http://schemas.microsoft.com/office/drawing/2014/main" id="{42F78FE5-F3FE-4642-9FCF-136680377BB1}"/>
               </a:ext>
             </a:extLst>
           </p:cNvPr>
           <p:cNvPicPr>
-            <a:picLocks noChangeAspect="1" noChangeArrowheads="1"/>
+            <a:picLocks noChangeAspect="1"/>
           </p:cNvPicPr>
           <p:nvPr/>
         </p:nvPicPr>
-        <p:blipFill rotWithShape="1">
-          <a:blip r:embed="rId2">
-            <a:extLst>
-              <a:ext uri="{28A0092B-C50C-407E-A947-70E740481C1C}">
-                <a14:useLocalDpi xmlns:a14="http://schemas.microsoft.com/office/drawing/2010/main" val="0"/>
-              </a:ext>
-            </a:extLst>
-          </a:blip>
-          <a:srcRect l="5625" t="8985" r="25517"/>
-          <a:stretch/>
+        <p:blipFill>
+          <a:blip r:embed="rId2"/>
+          <a:stretch>
+            <a:fillRect/>
+          </a:stretch>
         </p:blipFill>
-        <p:spPr bwMode="auto">
+        <p:spPr>
           <a:xfrm>
-            <a:off x="3645408" y="481505"/>
-            <a:ext cx="8395137" cy="5894990"/>
+            <a:off x="2680139" y="373522"/>
+            <a:ext cx="9399704" cy="6110955"/>
           </a:xfrm>
           <a:prstGeom prst="rect">
             <a:avLst/>
           </a:prstGeom>
-          <a:noFill/>
-          <a:extLst>
-            <a:ext uri="{909E8E84-426E-40DD-AFC4-6F175D3DCCD1}">
-              <a14:hiddenFill xmlns:a14="http://schemas.microsoft.com/office/drawing/2010/main">
-                <a:solidFill>
-                  <a:srgbClr val="FFFFFF"/>
-                </a:solidFill>
-              </a14:hiddenFill>
-            </a:ext>
-          </a:extLst>
         </p:spPr>
       </p:pic>
     </p:spTree>
@@ -7959,7 +8042,15 @@
             </a:r>
             <a:r>
               <a:rPr lang="en-US" dirty="0"/>
-              <a:t> intuit </a:t>
+              <a:t> </a:t>
+            </a:r>
+            <a:r>
+              <a:rPr lang="en-US" dirty="0" err="1"/>
+              <a:t>intuito</a:t>
+            </a:r>
+            <a:r>
+              <a:rPr lang="en-US" dirty="0"/>
+              <a:t> </a:t>
             </a:r>
             <a:r>
               <a:rPr lang="en-US" dirty="0" err="1"/>
@@ -7987,7 +8078,7 @@
             </a:r>
             <a:r>
               <a:rPr lang="en-US" dirty="0" err="1"/>
-              <a:t>pokemos</a:t>
+              <a:t>pokémos</a:t>
             </a:r>
             <a:r>
               <a:rPr lang="en-US" dirty="0"/>
@@ -8161,15 +8252,7 @@
             </a:r>
             <a:r>
               <a:rPr lang="en-US" dirty="0"/>
-              <a:t> </a:t>
-            </a:r>
-            <a:r>
-              <a:rPr lang="en-US" dirty="0" err="1"/>
-              <a:t>mudará</a:t>
-            </a:r>
-            <a:r>
-              <a:rPr lang="en-US" dirty="0"/>
-              <a:t>.</a:t>
+              <a:t> mudar.</a:t>
             </a:r>
           </a:p>
           <a:p>
@@ -8183,7 +8266,7 @@
             </a:r>
             <a:r>
               <a:rPr lang="en-US" dirty="0" err="1"/>
-              <a:t>pokemon</a:t>
+              <a:t>pokémon</a:t>
             </a:r>
             <a:endParaRPr lang="en-US" dirty="0"/>
           </a:p>
@@ -8211,7 +8294,7 @@
           <a:p>
             <a:r>
               <a:rPr lang="en-US" dirty="0"/>
-              <a:t>Barra de </a:t>
+              <a:t>Campo de </a:t>
             </a:r>
             <a:r>
               <a:rPr lang="en-US" dirty="0" err="1"/>

</xml_diff>